<commit_message>
added JPAD map in DOCS
</commit_message>
<xml_diff>
--- a/DOCS/GUI Slides/PresentazioneGUI.pptx
+++ b/DOCS/GUI Slides/PresentazioneGUI.pptx
@@ -7,7 +7,7 @@
     <p:sldMasterId id="2147483684" r:id="rId3"/>
   </p:sldMasterIdLst>
   <p:notesMasterIdLst>
-    <p:notesMasterId r:id="rId11"/>
+    <p:notesMasterId r:id="rId17"/>
   </p:notesMasterIdLst>
   <p:sldIdLst>
     <p:sldId id="257" r:id="rId4"/>
@@ -17,6 +17,12 @@
     <p:sldId id="261" r:id="rId8"/>
     <p:sldId id="263" r:id="rId9"/>
     <p:sldId id="264" r:id="rId10"/>
+    <p:sldId id="265" r:id="rId11"/>
+    <p:sldId id="268" r:id="rId12"/>
+    <p:sldId id="269" r:id="rId13"/>
+    <p:sldId id="270" r:id="rId14"/>
+    <p:sldId id="271" r:id="rId15"/>
+    <p:sldId id="267" r:id="rId16"/>
   </p:sldIdLst>
   <p:sldSz cx="9144000" cy="6858000" type="screen4x3"/>
   <p:notesSz cx="6858000" cy="9144000"/>
@@ -9918,7 +9924,7 @@
                   </a:schemeClr>
                 </a:solidFill>
               </a:rPr>
-              <a:t>JPAD Commander</a:t>
+              <a:t>TITLE</a:t>
             </a:r>
             <a:br>
               <a:rPr lang="it-IT" cap="all" dirty="0">
@@ -10041,64 +10047,6 @@
       </p:pic>
       <p:sp>
         <p:nvSpPr>
-          <p:cNvPr id="17" name="CasellaDiTesto 16"/>
-          <p:cNvSpPr txBox="1"/>
-          <p:nvPr/>
-        </p:nvSpPr>
-        <p:spPr>
-          <a:xfrm>
-            <a:off x="6516216" y="6191726"/>
-            <a:ext cx="1568635" cy="369332"/>
-          </a:xfrm>
-          <a:prstGeom prst="rect">
-            <a:avLst/>
-          </a:prstGeom>
-          <a:noFill/>
-        </p:spPr>
-        <p:txBody>
-          <a:bodyPr wrap="none" rtlCol="0">
-            <a:spAutoFit/>
-          </a:bodyPr>
-          <a:lstStyle/>
-          <a:p>
-            <a:r>
-              <a:rPr lang="it-IT" dirty="0"/>
-              <a:t>Vittorio Trifari</a:t>
-            </a:r>
-          </a:p>
-        </p:txBody>
-      </p:sp>
-      <p:sp>
-        <p:nvSpPr>
-          <p:cNvPr id="6" name="CasellaDiTesto 5"/>
-          <p:cNvSpPr txBox="1"/>
-          <p:nvPr/>
-        </p:nvSpPr>
-        <p:spPr>
-          <a:xfrm>
-            <a:off x="6516216" y="6529618"/>
-            <a:ext cx="1608133" cy="261610"/>
-          </a:xfrm>
-          <a:prstGeom prst="rect">
-            <a:avLst/>
-          </a:prstGeom>
-          <a:noFill/>
-        </p:spPr>
-        <p:txBody>
-          <a:bodyPr wrap="none" rtlCol="0">
-            <a:spAutoFit/>
-          </a:bodyPr>
-          <a:lstStyle/>
-          <a:p>
-            <a:r>
-              <a:rPr lang="it-IT" sz="1100" dirty="0"/>
-              <a:t>vittorio.trifari@unina.it</a:t>
-            </a:r>
-          </a:p>
-        </p:txBody>
-      </p:sp>
-      <p:sp>
-        <p:nvSpPr>
           <p:cNvPr id="7" name="CasellaDiTesto 6"/>
           <p:cNvSpPr txBox="1"/>
           <p:nvPr/>
@@ -10161,7 +10109,7 @@
       </p:sp>
       <p:sp>
         <p:nvSpPr>
-          <p:cNvPr id="8" name="Sottotitolo 7"/>
+          <p:cNvPr id="5" name="Sottotitolo 4"/>
           <p:cNvSpPr>
             <a:spLocks noGrp="1"/>
           </p:cNvSpPr>
@@ -10174,10 +10122,7 @@
           <a:bodyPr/>
           <a:lstStyle/>
           <a:p>
-            <a:r>
-              <a:rPr lang="en-US" dirty="0"/>
-              <a:t>A Graphic User Interface (GUI) for the JPAD library </a:t>
-            </a:r>
+            <a:endParaRPr lang="en-GB"/>
           </a:p>
         </p:txBody>
       </p:sp>
@@ -10185,6 +10130,711 @@
     <p:extLst>
       <p:ext uri="{BB962C8B-B14F-4D97-AF65-F5344CB8AC3E}">
         <p14:creationId xmlns:p14="http://schemas.microsoft.com/office/powerpoint/2010/main" val="862403163"/>
+      </p:ext>
+    </p:extLst>
+  </p:cSld>
+  <p:clrMapOvr>
+    <a:masterClrMapping/>
+  </p:clrMapOvr>
+</p:sld>
+</file>
+
+<file path=ppt/slides/slide10.xml><?xml version="1.0" encoding="utf-8"?>
+<p:sld xmlns:a="http://schemas.openxmlformats.org/drawingml/2006/main" xmlns:r="http://schemas.openxmlformats.org/officeDocument/2006/relationships" xmlns:p="http://schemas.openxmlformats.org/presentationml/2006/main">
+  <p:cSld>
+    <p:spTree>
+      <p:nvGrpSpPr>
+        <p:cNvPr id="1" name=""/>
+        <p:cNvGrpSpPr/>
+        <p:nvPr/>
+      </p:nvGrpSpPr>
+      <p:grpSpPr>
+        <a:xfrm>
+          <a:off x="0" y="0"/>
+          <a:ext cx="0" cy="0"/>
+          <a:chOff x="0" y="0"/>
+          <a:chExt cx="0" cy="0"/>
+        </a:xfrm>
+      </p:grpSpPr>
+      <p:sp>
+        <p:nvSpPr>
+          <p:cNvPr id="2" name="Titolo 1"/>
+          <p:cNvSpPr>
+            <a:spLocks noGrp="1"/>
+          </p:cNvSpPr>
+          <p:nvPr>
+            <p:ph type="title"/>
+          </p:nvPr>
+        </p:nvSpPr>
+        <p:spPr/>
+        <p:txBody>
+          <a:bodyPr/>
+          <a:lstStyle/>
+          <a:p>
+            <a:r>
+              <a:rPr lang="it-IT" dirty="0"/>
+              <a:t>JPAD Modulo Strutture</a:t>
+            </a:r>
+            <a:endParaRPr lang="en-GB" dirty="0"/>
+          </a:p>
+        </p:txBody>
+      </p:sp>
+      <p:sp>
+        <p:nvSpPr>
+          <p:cNvPr id="3" name="CasellaDiTesto 2"/>
+          <p:cNvSpPr txBox="1"/>
+          <p:nvPr/>
+        </p:nvSpPr>
+        <p:spPr>
+          <a:xfrm>
+            <a:off x="251520" y="1340768"/>
+            <a:ext cx="8640960" cy="923330"/>
+          </a:xfrm>
+          <a:prstGeom prst="rect">
+            <a:avLst/>
+          </a:prstGeom>
+          <a:noFill/>
+        </p:spPr>
+        <p:txBody>
+          <a:bodyPr wrap="square" rtlCol="0">
+            <a:spAutoFit/>
+          </a:bodyPr>
+          <a:lstStyle/>
+          <a:p>
+            <a:r>
+              <a:rPr lang="it-IT" dirty="0"/>
+              <a:t>Per quanto concerne la </a:t>
+            </a:r>
+            <a:r>
+              <a:rPr lang="it-IT" b="1" dirty="0"/>
+              <a:t>distribuzione delle masse aggiunte</a:t>
+            </a:r>
+            <a:r>
+              <a:rPr lang="it-IT" dirty="0"/>
+              <a:t>, sono state modellate sia le masse distribuite dei serbatoi, che quelle dei sistemi di bordo d’attacco e bordo di uscita. </a:t>
+            </a:r>
+            <a:endParaRPr lang="en-GB" dirty="0"/>
+          </a:p>
+        </p:txBody>
+      </p:sp>
+      <p:pic>
+        <p:nvPicPr>
+          <p:cNvPr id="8" name="Immagine 7"/>
+          <p:cNvPicPr>
+            <a:picLocks noChangeAspect="1"/>
+          </p:cNvPicPr>
+          <p:nvPr/>
+        </p:nvPicPr>
+        <p:blipFill>
+          <a:blip r:embed="rId2">
+            <a:extLst>
+              <a:ext uri="{28A0092B-C50C-407E-A947-70E740481C1C}">
+                <a14:useLocalDpi xmlns:a14="http://schemas.microsoft.com/office/drawing/2010/main" val="0"/>
+              </a:ext>
+            </a:extLst>
+          </a:blip>
+          <a:stretch>
+            <a:fillRect/>
+          </a:stretch>
+        </p:blipFill>
+        <p:spPr>
+          <a:xfrm>
+            <a:off x="971600" y="2564904"/>
+            <a:ext cx="7075499" cy="3052683"/>
+          </a:xfrm>
+          <a:prstGeom prst="rect">
+            <a:avLst/>
+          </a:prstGeom>
+        </p:spPr>
+      </p:pic>
+      <p:sp>
+        <p:nvSpPr>
+          <p:cNvPr id="9" name="CasellaDiTesto 8"/>
+          <p:cNvSpPr txBox="1"/>
+          <p:nvPr/>
+        </p:nvSpPr>
+        <p:spPr>
+          <a:xfrm>
+            <a:off x="2843808" y="5661248"/>
+            <a:ext cx="3736729" cy="369332"/>
+          </a:xfrm>
+          <a:prstGeom prst="rect">
+            <a:avLst/>
+          </a:prstGeom>
+          <a:noFill/>
+        </p:spPr>
+        <p:txBody>
+          <a:bodyPr wrap="none" rtlCol="0">
+            <a:spAutoFit/>
+          </a:bodyPr>
+          <a:lstStyle/>
+          <a:p>
+            <a:r>
+              <a:rPr lang="it-IT" dirty="0"/>
+              <a:t>Distribuzione delle masse aggiunte</a:t>
+            </a:r>
+            <a:endParaRPr lang="en-GB" dirty="0"/>
+          </a:p>
+        </p:txBody>
+      </p:sp>
+    </p:spTree>
+    <p:extLst>
+      <p:ext uri="{BB962C8B-B14F-4D97-AF65-F5344CB8AC3E}">
+        <p14:creationId xmlns:p14="http://schemas.microsoft.com/office/powerpoint/2010/main" val="3841811628"/>
+      </p:ext>
+    </p:extLst>
+  </p:cSld>
+  <p:clrMapOvr>
+    <a:masterClrMapping/>
+  </p:clrMapOvr>
+</p:sld>
+</file>
+
+<file path=ppt/slides/slide11.xml><?xml version="1.0" encoding="utf-8"?>
+<p:sld xmlns:a="http://schemas.openxmlformats.org/drawingml/2006/main" xmlns:r="http://schemas.openxmlformats.org/officeDocument/2006/relationships" xmlns:p="http://schemas.openxmlformats.org/presentationml/2006/main">
+  <p:cSld>
+    <p:spTree>
+      <p:nvGrpSpPr>
+        <p:cNvPr id="1" name=""/>
+        <p:cNvGrpSpPr/>
+        <p:nvPr/>
+      </p:nvGrpSpPr>
+      <p:grpSpPr>
+        <a:xfrm>
+          <a:off x="0" y="0"/>
+          <a:ext cx="0" cy="0"/>
+          <a:chOff x="0" y="0"/>
+          <a:chExt cx="0" cy="0"/>
+        </a:xfrm>
+      </p:grpSpPr>
+      <p:sp>
+        <p:nvSpPr>
+          <p:cNvPr id="2" name="Titolo 1"/>
+          <p:cNvSpPr>
+            <a:spLocks noGrp="1"/>
+          </p:cNvSpPr>
+          <p:nvPr>
+            <p:ph type="title"/>
+          </p:nvPr>
+        </p:nvSpPr>
+        <p:spPr/>
+        <p:txBody>
+          <a:bodyPr/>
+          <a:lstStyle/>
+          <a:p>
+            <a:r>
+              <a:rPr lang="it-IT" dirty="0"/>
+              <a:t>JPAD Modulo Strutture</a:t>
+            </a:r>
+            <a:endParaRPr lang="en-GB" dirty="0"/>
+          </a:p>
+        </p:txBody>
+      </p:sp>
+      <p:sp>
+        <p:nvSpPr>
+          <p:cNvPr id="3" name="CasellaDiTesto 2"/>
+          <p:cNvSpPr txBox="1"/>
+          <p:nvPr/>
+        </p:nvSpPr>
+        <p:spPr>
+          <a:xfrm>
+            <a:off x="251520" y="1340768"/>
+            <a:ext cx="8640960" cy="1200329"/>
+          </a:xfrm>
+          <a:prstGeom prst="rect">
+            <a:avLst/>
+          </a:prstGeom>
+          <a:noFill/>
+        </p:spPr>
+        <p:txBody>
+          <a:bodyPr wrap="square" rtlCol="0">
+            <a:spAutoFit/>
+          </a:bodyPr>
+          <a:lstStyle/>
+          <a:p>
+            <a:r>
+              <a:rPr lang="it-IT" dirty="0"/>
+              <a:t>Le </a:t>
+            </a:r>
+            <a:r>
+              <a:rPr lang="it-IT" b="1" dirty="0"/>
+              <a:t>forze esterne </a:t>
+            </a:r>
+            <a:r>
+              <a:rPr lang="it-IT" dirty="0"/>
+              <a:t>agenti sulla struttura vengono fornite in uscita dalla libreria JPAD e vengono applicate per verificare gli stress e le deformazioni della struttura. I carichi dinamici sono dovuti ad effetti aeroelastici. Pertanto la loro modellazione è definita da un ulteriore modello aerodinamico che viene interpolato a quello strutturale. </a:t>
+            </a:r>
+            <a:endParaRPr lang="en-GB" dirty="0"/>
+          </a:p>
+        </p:txBody>
+      </p:sp>
+      <p:pic>
+        <p:nvPicPr>
+          <p:cNvPr id="5" name="Immagine 4"/>
+          <p:cNvPicPr>
+            <a:picLocks noChangeAspect="1"/>
+          </p:cNvPicPr>
+          <p:nvPr/>
+        </p:nvPicPr>
+        <p:blipFill>
+          <a:blip r:embed="rId2">
+            <a:extLst>
+              <a:ext uri="{28A0092B-C50C-407E-A947-70E740481C1C}">
+                <a14:useLocalDpi xmlns:a14="http://schemas.microsoft.com/office/drawing/2010/main" val="0"/>
+              </a:ext>
+            </a:extLst>
+          </a:blip>
+          <a:stretch>
+            <a:fillRect/>
+          </a:stretch>
+        </p:blipFill>
+        <p:spPr>
+          <a:xfrm>
+            <a:off x="593812" y="2541097"/>
+            <a:ext cx="7956376" cy="3502034"/>
+          </a:xfrm>
+          <a:prstGeom prst="rect">
+            <a:avLst/>
+          </a:prstGeom>
+        </p:spPr>
+      </p:pic>
+      <p:sp>
+        <p:nvSpPr>
+          <p:cNvPr id="10" name="CasellaDiTesto 9"/>
+          <p:cNvSpPr txBox="1"/>
+          <p:nvPr/>
+        </p:nvSpPr>
+        <p:spPr>
+          <a:xfrm>
+            <a:off x="2703635" y="6043131"/>
+            <a:ext cx="3255635" cy="369332"/>
+          </a:xfrm>
+          <a:prstGeom prst="rect">
+            <a:avLst/>
+          </a:prstGeom>
+          <a:noFill/>
+        </p:spPr>
+        <p:txBody>
+          <a:bodyPr wrap="none" rtlCol="0">
+            <a:spAutoFit/>
+          </a:bodyPr>
+          <a:lstStyle/>
+          <a:p>
+            <a:r>
+              <a:rPr lang="it-IT" dirty="0"/>
+              <a:t>Distribuzione di forze e vincoli</a:t>
+            </a:r>
+            <a:endParaRPr lang="en-GB" dirty="0"/>
+          </a:p>
+        </p:txBody>
+      </p:sp>
+    </p:spTree>
+    <p:extLst>
+      <p:ext uri="{BB962C8B-B14F-4D97-AF65-F5344CB8AC3E}">
+        <p14:creationId xmlns:p14="http://schemas.microsoft.com/office/powerpoint/2010/main" val="244042781"/>
+      </p:ext>
+    </p:extLst>
+  </p:cSld>
+  <p:clrMapOvr>
+    <a:masterClrMapping/>
+  </p:clrMapOvr>
+</p:sld>
+</file>
+
+<file path=ppt/slides/slide12.xml><?xml version="1.0" encoding="utf-8"?>
+<p:sld xmlns:a="http://schemas.openxmlformats.org/drawingml/2006/main" xmlns:r="http://schemas.openxmlformats.org/officeDocument/2006/relationships" xmlns:p="http://schemas.openxmlformats.org/presentationml/2006/main">
+  <p:cSld>
+    <p:spTree>
+      <p:nvGrpSpPr>
+        <p:cNvPr id="1" name=""/>
+        <p:cNvGrpSpPr/>
+        <p:nvPr/>
+      </p:nvGrpSpPr>
+      <p:grpSpPr>
+        <a:xfrm>
+          <a:off x="0" y="0"/>
+          <a:ext cx="0" cy="0"/>
+          <a:chOff x="0" y="0"/>
+          <a:chExt cx="0" cy="0"/>
+        </a:xfrm>
+      </p:grpSpPr>
+      <p:sp>
+        <p:nvSpPr>
+          <p:cNvPr id="2" name="Titolo 1"/>
+          <p:cNvSpPr>
+            <a:spLocks noGrp="1"/>
+          </p:cNvSpPr>
+          <p:nvPr>
+            <p:ph type="title"/>
+          </p:nvPr>
+        </p:nvSpPr>
+        <p:spPr/>
+        <p:txBody>
+          <a:bodyPr>
+            <a:normAutofit fontScale="90000"/>
+          </a:bodyPr>
+          <a:lstStyle/>
+          <a:p>
+            <a:r>
+              <a:rPr lang="it-IT" dirty="0"/>
+              <a:t>JPAD Modulo Strutture - analisi statica</a:t>
+            </a:r>
+            <a:endParaRPr lang="en-GB" dirty="0"/>
+          </a:p>
+        </p:txBody>
+      </p:sp>
+      <p:sp>
+        <p:nvSpPr>
+          <p:cNvPr id="5" name="CasellaDiTesto 4"/>
+          <p:cNvSpPr txBox="1"/>
+          <p:nvPr/>
+        </p:nvSpPr>
+        <p:spPr>
+          <a:xfrm>
+            <a:off x="107504" y="1556792"/>
+            <a:ext cx="9036496" cy="646331"/>
+          </a:xfrm>
+          <a:prstGeom prst="rect">
+            <a:avLst/>
+          </a:prstGeom>
+          <a:noFill/>
+        </p:spPr>
+        <p:txBody>
+          <a:bodyPr wrap="square" rtlCol="0">
+            <a:spAutoFit/>
+          </a:bodyPr>
+          <a:lstStyle/>
+          <a:p>
+            <a:r>
+              <a:rPr lang="it-IT" dirty="0"/>
+              <a:t>La soluzione statica è ottenuta tramite la </a:t>
+            </a:r>
+            <a:r>
+              <a:rPr lang="it-IT" i="1" dirty="0"/>
+              <a:t>Sol101 </a:t>
+            </a:r>
+            <a:r>
+              <a:rPr lang="it-IT" dirty="0"/>
+              <a:t>di MSC.NASTRAN. La semiala è sollecitata con una distribuzione di forze che si ha per un fattore di carico uguale a 2.5. </a:t>
+            </a:r>
+            <a:endParaRPr lang="en-GB" dirty="0"/>
+          </a:p>
+        </p:txBody>
+      </p:sp>
+      <p:sp>
+        <p:nvSpPr>
+          <p:cNvPr id="3" name="CasellaDiTesto 2"/>
+          <p:cNvSpPr txBox="1"/>
+          <p:nvPr/>
+        </p:nvSpPr>
+        <p:spPr>
+          <a:xfrm>
+            <a:off x="971600" y="5605143"/>
+            <a:ext cx="6914048" cy="646331"/>
+          </a:xfrm>
+          <a:prstGeom prst="rect">
+            <a:avLst/>
+          </a:prstGeom>
+          <a:noFill/>
+        </p:spPr>
+        <p:txBody>
+          <a:bodyPr wrap="square" rtlCol="0">
+            <a:spAutoFit/>
+          </a:bodyPr>
+          <a:lstStyle/>
+          <a:p>
+            <a:pPr algn="ctr"/>
+            <a:r>
+              <a:rPr lang="it-IT" dirty="0"/>
+              <a:t>Soluzione statica.</a:t>
+            </a:r>
+          </a:p>
+          <a:p>
+            <a:r>
+              <a:rPr lang="it-IT" dirty="0"/>
+              <a:t> </a:t>
+            </a:r>
+            <a:r>
+              <a:rPr lang="it-IT" sz="1200" dirty="0"/>
+              <a:t>I colori freddi rappresentano le zone maggiormente stressate, quelli caldi le zone meno sollecitate. </a:t>
+            </a:r>
+            <a:endParaRPr lang="en-GB" dirty="0"/>
+          </a:p>
+        </p:txBody>
+      </p:sp>
+      <p:pic>
+        <p:nvPicPr>
+          <p:cNvPr id="10" name="Immagine 9"/>
+          <p:cNvPicPr>
+            <a:picLocks noChangeAspect="1"/>
+          </p:cNvPicPr>
+          <p:nvPr/>
+        </p:nvPicPr>
+        <p:blipFill>
+          <a:blip r:embed="rId2">
+            <a:extLst>
+              <a:ext uri="{28A0092B-C50C-407E-A947-70E740481C1C}">
+                <a14:useLocalDpi xmlns:a14="http://schemas.microsoft.com/office/drawing/2010/main" val="0"/>
+              </a:ext>
+            </a:extLst>
+          </a:blip>
+          <a:stretch>
+            <a:fillRect/>
+          </a:stretch>
+        </p:blipFill>
+        <p:spPr>
+          <a:xfrm>
+            <a:off x="611560" y="2226669"/>
+            <a:ext cx="7830616" cy="3378474"/>
+          </a:xfrm>
+          <a:prstGeom prst="rect">
+            <a:avLst/>
+          </a:prstGeom>
+        </p:spPr>
+      </p:pic>
+    </p:spTree>
+    <p:extLst>
+      <p:ext uri="{BB962C8B-B14F-4D97-AF65-F5344CB8AC3E}">
+        <p14:creationId xmlns:p14="http://schemas.microsoft.com/office/powerpoint/2010/main" val="1080723888"/>
+      </p:ext>
+    </p:extLst>
+  </p:cSld>
+  <p:clrMapOvr>
+    <a:masterClrMapping/>
+  </p:clrMapOvr>
+</p:sld>
+</file>
+
+<file path=ppt/slides/slide13.xml><?xml version="1.0" encoding="utf-8"?>
+<p:sld xmlns:a="http://schemas.openxmlformats.org/drawingml/2006/main" xmlns:r="http://schemas.openxmlformats.org/officeDocument/2006/relationships" xmlns:p="http://schemas.openxmlformats.org/presentationml/2006/main">
+  <p:cSld>
+    <p:spTree>
+      <p:nvGrpSpPr>
+        <p:cNvPr id="1" name=""/>
+        <p:cNvGrpSpPr/>
+        <p:nvPr/>
+      </p:nvGrpSpPr>
+      <p:grpSpPr>
+        <a:xfrm>
+          <a:off x="0" y="0"/>
+          <a:ext cx="0" cy="0"/>
+          <a:chOff x="0" y="0"/>
+          <a:chExt cx="0" cy="0"/>
+        </a:xfrm>
+      </p:grpSpPr>
+      <p:sp>
+        <p:nvSpPr>
+          <p:cNvPr id="2" name="Titolo 1"/>
+          <p:cNvSpPr>
+            <a:spLocks noGrp="1"/>
+          </p:cNvSpPr>
+          <p:nvPr>
+            <p:ph type="title"/>
+          </p:nvPr>
+        </p:nvSpPr>
+        <p:spPr/>
+        <p:txBody>
+          <a:bodyPr>
+            <a:normAutofit fontScale="90000"/>
+          </a:bodyPr>
+          <a:lstStyle/>
+          <a:p>
+            <a:r>
+              <a:rPr lang="it-IT" dirty="0"/>
+              <a:t>JPAD Modulo Strutture - analisi modale</a:t>
+            </a:r>
+            <a:endParaRPr lang="en-GB" dirty="0"/>
+          </a:p>
+        </p:txBody>
+      </p:sp>
+      <p:sp>
+        <p:nvSpPr>
+          <p:cNvPr id="5" name="CasellaDiTesto 4"/>
+          <p:cNvSpPr txBox="1"/>
+          <p:nvPr/>
+        </p:nvSpPr>
+        <p:spPr>
+          <a:xfrm>
+            <a:off x="107504" y="1556792"/>
+            <a:ext cx="8928992" cy="646331"/>
+          </a:xfrm>
+          <a:prstGeom prst="rect">
+            <a:avLst/>
+          </a:prstGeom>
+          <a:noFill/>
+        </p:spPr>
+        <p:txBody>
+          <a:bodyPr wrap="square" rtlCol="0">
+            <a:spAutoFit/>
+          </a:bodyPr>
+          <a:lstStyle/>
+          <a:p>
+            <a:r>
+              <a:rPr lang="it-IT" dirty="0"/>
+              <a:t>Sono mostrati i risultati dell’analisi modale (</a:t>
+            </a:r>
+            <a:r>
+              <a:rPr lang="it-IT" i="1" dirty="0"/>
+              <a:t>Sol103 </a:t>
+            </a:r>
+            <a:r>
+              <a:rPr lang="it-IT" dirty="0"/>
+              <a:t>) ottenuta applicando le opportune condizioni di vincolo e la tecnica di condensazione statica per il filtro dei modi locali </a:t>
+            </a:r>
+            <a:endParaRPr lang="en-GB" dirty="0"/>
+          </a:p>
+        </p:txBody>
+      </p:sp>
+      <p:pic>
+        <p:nvPicPr>
+          <p:cNvPr id="6" name="Immagine 5"/>
+          <p:cNvPicPr>
+            <a:picLocks noChangeAspect="1"/>
+          </p:cNvPicPr>
+          <p:nvPr/>
+        </p:nvPicPr>
+        <p:blipFill rotWithShape="1">
+          <a:blip r:embed="rId2">
+            <a:extLst>
+              <a:ext uri="{28A0092B-C50C-407E-A947-70E740481C1C}">
+                <a14:useLocalDpi xmlns:a14="http://schemas.microsoft.com/office/drawing/2010/main" val="0"/>
+              </a:ext>
+            </a:extLst>
+          </a:blip>
+          <a:srcRect r="9391"/>
+          <a:stretch/>
+        </p:blipFill>
+        <p:spPr>
+          <a:xfrm>
+            <a:off x="250964" y="2176859"/>
+            <a:ext cx="4248472" cy="2022950"/>
+          </a:xfrm>
+          <a:prstGeom prst="rect">
+            <a:avLst/>
+          </a:prstGeom>
+        </p:spPr>
+      </p:pic>
+      <p:pic>
+        <p:nvPicPr>
+          <p:cNvPr id="7" name="Immagine 6"/>
+          <p:cNvPicPr>
+            <a:picLocks noChangeAspect="1"/>
+          </p:cNvPicPr>
+          <p:nvPr/>
+        </p:nvPicPr>
+        <p:blipFill rotWithShape="1">
+          <a:blip r:embed="rId3">
+            <a:extLst>
+              <a:ext uri="{28A0092B-C50C-407E-A947-70E740481C1C}">
+                <a14:useLocalDpi xmlns:a14="http://schemas.microsoft.com/office/drawing/2010/main" val="0"/>
+              </a:ext>
+            </a:extLst>
+          </a:blip>
+          <a:srcRect r="9499"/>
+          <a:stretch/>
+        </p:blipFill>
+        <p:spPr>
+          <a:xfrm>
+            <a:off x="4669856" y="2368212"/>
+            <a:ext cx="4229277" cy="2016224"/>
+          </a:xfrm>
+          <a:prstGeom prst="rect">
+            <a:avLst/>
+          </a:prstGeom>
+        </p:spPr>
+      </p:pic>
+      <p:pic>
+        <p:nvPicPr>
+          <p:cNvPr id="8" name="Immagine 7"/>
+          <p:cNvPicPr>
+            <a:picLocks noChangeAspect="1"/>
+          </p:cNvPicPr>
+          <p:nvPr/>
+        </p:nvPicPr>
+        <p:blipFill rotWithShape="1">
+          <a:blip r:embed="rId4" cstate="print">
+            <a:extLst>
+              <a:ext uri="{28A0092B-C50C-407E-A947-70E740481C1C}">
+                <a14:useLocalDpi xmlns:a14="http://schemas.microsoft.com/office/drawing/2010/main" val="0"/>
+              </a:ext>
+            </a:extLst>
+          </a:blip>
+          <a:srcRect r="6532"/>
+          <a:stretch/>
+        </p:blipFill>
+        <p:spPr>
+          <a:xfrm>
+            <a:off x="250964" y="4293096"/>
+            <a:ext cx="4211960" cy="1944216"/>
+          </a:xfrm>
+          <a:prstGeom prst="rect">
+            <a:avLst/>
+          </a:prstGeom>
+        </p:spPr>
+      </p:pic>
+      <p:pic>
+        <p:nvPicPr>
+          <p:cNvPr id="9" name="Immagine 8"/>
+          <p:cNvPicPr>
+            <a:picLocks noChangeAspect="1"/>
+          </p:cNvPicPr>
+          <p:nvPr/>
+        </p:nvPicPr>
+        <p:blipFill rotWithShape="1">
+          <a:blip r:embed="rId5" cstate="print">
+            <a:extLst>
+              <a:ext uri="{28A0092B-C50C-407E-A947-70E740481C1C}">
+                <a14:useLocalDpi xmlns:a14="http://schemas.microsoft.com/office/drawing/2010/main" val="0"/>
+              </a:ext>
+            </a:extLst>
+          </a:blip>
+          <a:srcRect r="7319"/>
+          <a:stretch/>
+        </p:blipFill>
+        <p:spPr>
+          <a:xfrm>
+            <a:off x="4637335" y="4483278"/>
+            <a:ext cx="4176464" cy="1944216"/>
+          </a:xfrm>
+          <a:prstGeom prst="rect">
+            <a:avLst/>
+          </a:prstGeom>
+        </p:spPr>
+      </p:pic>
+      <p:sp>
+        <p:nvSpPr>
+          <p:cNvPr id="3" name="CasellaDiTesto 2"/>
+          <p:cNvSpPr txBox="1"/>
+          <p:nvPr/>
+        </p:nvSpPr>
+        <p:spPr>
+          <a:xfrm>
+            <a:off x="2483768" y="6519897"/>
+            <a:ext cx="3885872" cy="369332"/>
+          </a:xfrm>
+          <a:prstGeom prst="rect">
+            <a:avLst/>
+          </a:prstGeom>
+          <a:noFill/>
+        </p:spPr>
+        <p:txBody>
+          <a:bodyPr wrap="none" rtlCol="0">
+            <a:spAutoFit/>
+          </a:bodyPr>
+          <a:lstStyle/>
+          <a:p>
+            <a:r>
+              <a:rPr lang="it-IT" dirty="0"/>
+              <a:t>Primi quattro modi di vibrare dell’ala</a:t>
+            </a:r>
+            <a:endParaRPr lang="en-GB" dirty="0"/>
+          </a:p>
+        </p:txBody>
+      </p:sp>
+    </p:spTree>
+    <p:extLst>
+      <p:ext uri="{BB962C8B-B14F-4D97-AF65-F5344CB8AC3E}">
+        <p14:creationId xmlns:p14="http://schemas.microsoft.com/office/powerpoint/2010/main" val="3461222926"/>
       </p:ext>
     </p:extLst>
   </p:cSld>
@@ -10221,7 +10871,12 @@
             <p:ph type="title"/>
           </p:nvPr>
         </p:nvSpPr>
-        <p:spPr/>
+        <p:spPr>
+          <a:xfrm>
+            <a:off x="395536" y="332656"/>
+            <a:ext cx="8507288" cy="1143000"/>
+          </a:xfrm>
+        </p:spPr>
         <p:txBody>
           <a:bodyPr>
             <a:normAutofit fontScale="90000"/>
@@ -10229,8 +10884,12 @@
           <a:lstStyle/>
           <a:p>
             <a:r>
+              <a:rPr lang="en-US" dirty="0" err="1"/>
+              <a:t>Introduzione</a:t>
+            </a:r>
+            <a:r>
               <a:rPr lang="en-US" dirty="0"/>
-              <a:t>Introducing JPADCommander</a:t>
+              <a:t> a JPADCommander</a:t>
             </a:r>
           </a:p>
         </p:txBody>
@@ -10255,7 +10914,31 @@
             <a:pPr algn="just"/>
             <a:r>
               <a:rPr lang="en-US" sz="2400" dirty="0"/>
-              <a:t>A user-friendly graphic interface for the JPAD library.</a:t>
+              <a:t>Una “User-friendly” </a:t>
+            </a:r>
+            <a:r>
+              <a:rPr lang="en-US" sz="2400" dirty="0" err="1"/>
+              <a:t>interfaccia</a:t>
+            </a:r>
+            <a:r>
+              <a:rPr lang="en-US" sz="2400" dirty="0"/>
+              <a:t> </a:t>
+            </a:r>
+            <a:r>
+              <a:rPr lang="en-US" sz="2400" dirty="0" err="1"/>
+              <a:t>grafica</a:t>
+            </a:r>
+            <a:r>
+              <a:rPr lang="en-US" sz="2400" dirty="0"/>
+              <a:t> per la </a:t>
+            </a:r>
+            <a:r>
+              <a:rPr lang="en-US" sz="2400" dirty="0" err="1"/>
+              <a:t>libreria</a:t>
+            </a:r>
+            <a:r>
+              <a:rPr lang="en-US" sz="2400" dirty="0"/>
+              <a:t> JPAD </a:t>
             </a:r>
           </a:p>
           <a:p>
@@ -10267,25 +10950,160 @@
           <a:p>
             <a:pPr algn="just"/>
             <a:r>
+              <a:rPr lang="en-US" sz="2400" dirty="0" err="1"/>
+              <a:t>Progettata</a:t>
+            </a:r>
+            <a:r>
               <a:rPr lang="en-US" sz="2400" dirty="0"/>
-              <a:t>Designed as a wizard that will guide the user from the definition of the aircraft model to the post-processing of the analyses results.</a:t>
-            </a:r>
-          </a:p>
-          <a:p>
-            <a:pPr marL="0" indent="0" algn="just">
-              <a:buNone/>
-            </a:pPr>
-            <a:endParaRPr lang="en-US" sz="2400" dirty="0"/>
+              <a:t> per </a:t>
+            </a:r>
+            <a:r>
+              <a:rPr lang="en-US" sz="2400" dirty="0" err="1"/>
+              <a:t>guidare</a:t>
+            </a:r>
+            <a:r>
+              <a:rPr lang="en-US" sz="2400" dirty="0"/>
+              <a:t> </a:t>
+            </a:r>
+            <a:r>
+              <a:rPr lang="en-US" sz="2400" dirty="0" err="1"/>
+              <a:t>l’utente</a:t>
+            </a:r>
+            <a:r>
+              <a:rPr lang="en-US" sz="2400" dirty="0"/>
+              <a:t> </a:t>
+            </a:r>
+            <a:r>
+              <a:rPr lang="en-US" sz="2400" dirty="0" err="1"/>
+              <a:t>dalla</a:t>
+            </a:r>
+            <a:r>
+              <a:rPr lang="en-US" sz="2400" dirty="0"/>
+              <a:t> </a:t>
+            </a:r>
+            <a:r>
+              <a:rPr lang="en-US" sz="2400" dirty="0" err="1"/>
+              <a:t>fase</a:t>
+            </a:r>
+            <a:r>
+              <a:rPr lang="en-US" sz="2400" dirty="0"/>
+              <a:t> di </a:t>
+            </a:r>
+            <a:r>
+              <a:rPr lang="en-US" sz="2400" dirty="0" err="1"/>
+              <a:t>definizione</a:t>
+            </a:r>
+            <a:r>
+              <a:rPr lang="en-US" sz="2400" dirty="0"/>
+              <a:t> di un </a:t>
+            </a:r>
+            <a:r>
+              <a:rPr lang="en-US" sz="2400" dirty="0" err="1"/>
+              <a:t>velivolo</a:t>
+            </a:r>
+            <a:r>
+              <a:rPr lang="en-US" sz="2400" dirty="0"/>
+              <a:t> </a:t>
+            </a:r>
+            <a:r>
+              <a:rPr lang="en-US" sz="2400" dirty="0" err="1"/>
+              <a:t>fino</a:t>
+            </a:r>
+            <a:r>
+              <a:rPr lang="en-US" sz="2400" dirty="0"/>
+              <a:t> al post- processing </a:t>
+            </a:r>
+            <a:r>
+              <a:rPr lang="en-US" sz="2400" dirty="0" err="1"/>
+              <a:t>dell’analisi</a:t>
+            </a:r>
+            <a:r>
+              <a:rPr lang="en-US" sz="2400" dirty="0"/>
+              <a:t> </a:t>
+            </a:r>
+            <a:r>
+              <a:rPr lang="en-US" sz="2400" dirty="0" err="1"/>
+              <a:t>dei</a:t>
+            </a:r>
+            <a:r>
+              <a:rPr lang="en-US" sz="2400" dirty="0"/>
+              <a:t> </a:t>
+            </a:r>
+            <a:r>
+              <a:rPr lang="en-US" sz="2400" dirty="0" err="1"/>
+              <a:t>risultati</a:t>
+            </a:r>
+            <a:r>
+              <a:rPr lang="en-US" sz="2400" dirty="0"/>
+              <a:t>.</a:t>
+            </a:r>
           </a:p>
           <a:p>
             <a:pPr algn="just"/>
             <a:r>
+              <a:rPr lang="en-US" sz="2400" dirty="0" err="1"/>
+              <a:t>Possibilità</a:t>
+            </a:r>
+            <a:r>
               <a:rPr lang="en-US" sz="2400" dirty="0"/>
-              <a:t>Possibility to generate and export the CAD model of the aircraft in exam</a:t>
-            </a:r>
-          </a:p>
-          <a:p>
-            <a:endParaRPr lang="en-US" sz="2400" dirty="0"/>
+              <a:t> di </a:t>
+            </a:r>
+            <a:r>
+              <a:rPr lang="en-US" sz="2400" dirty="0" err="1"/>
+              <a:t>generare</a:t>
+            </a:r>
+            <a:r>
+              <a:rPr lang="en-US" sz="2400" dirty="0"/>
+              <a:t> </a:t>
+            </a:r>
+            <a:r>
+              <a:rPr lang="en-US" sz="2400" dirty="0" err="1"/>
+              <a:t>ed</a:t>
+            </a:r>
+            <a:r>
+              <a:rPr lang="en-US" sz="2400" dirty="0"/>
+              <a:t> </a:t>
+            </a:r>
+            <a:r>
+              <a:rPr lang="en-US" sz="2400" dirty="0" err="1"/>
+              <a:t>esportare</a:t>
+            </a:r>
+            <a:r>
+              <a:rPr lang="en-US" sz="2400" dirty="0"/>
+              <a:t> </a:t>
+            </a:r>
+            <a:r>
+              <a:rPr lang="en-US" sz="2400" dirty="0" err="1"/>
+              <a:t>il</a:t>
+            </a:r>
+            <a:r>
+              <a:rPr lang="en-US" sz="2400" dirty="0"/>
+              <a:t> </a:t>
+            </a:r>
+            <a:r>
+              <a:rPr lang="en-US" sz="2400" dirty="0" err="1"/>
+              <a:t>modello</a:t>
+            </a:r>
+            <a:r>
+              <a:rPr lang="en-US" sz="2400" dirty="0"/>
+              <a:t> CAD del </a:t>
+            </a:r>
+            <a:r>
+              <a:rPr lang="en-US" sz="2400" dirty="0" err="1"/>
+              <a:t>velivolo</a:t>
+            </a:r>
+            <a:r>
+              <a:rPr lang="en-US" sz="2400" dirty="0"/>
+              <a:t> in </a:t>
+            </a:r>
+            <a:r>
+              <a:rPr lang="en-US" sz="2400" dirty="0" err="1"/>
+              <a:t>analisi</a:t>
+            </a:r>
+            <a:r>
+              <a:rPr lang="en-US" sz="2400" dirty="0"/>
+              <a:t>.</a:t>
+            </a:r>
           </a:p>
         </p:txBody>
       </p:sp>
@@ -10332,13 +11150,17 @@
         <p:spPr/>
         <p:txBody>
           <a:bodyPr>
-            <a:normAutofit fontScale="90000"/>
+            <a:normAutofit/>
           </a:bodyPr>
           <a:lstStyle/>
           <a:p>
             <a:r>
+              <a:rPr lang="en-US" dirty="0" err="1"/>
+              <a:t>JPADCommander</a:t>
+            </a:r>
+            <a:r>
               <a:rPr lang="en-US" dirty="0"/>
-              <a:t>JPADCommander – Main view</a:t>
+              <a:t> </a:t>
             </a:r>
           </a:p>
         </p:txBody>
@@ -10447,33 +11269,30 @@
           <a:lstStyle/>
           <a:p>
             <a:r>
-              <a:rPr lang="en-US" dirty="0"/>
-              <a:t>Three ways of aircraft definition:</a:t>
+              <a:rPr lang="it-IT" dirty="0"/>
+              <a:t>Un velivolo può essere definite in tre modi:</a:t>
             </a:r>
           </a:p>
           <a:p>
             <a:pPr lvl="1"/>
             <a:r>
-              <a:rPr lang="en-US" dirty="0"/>
-              <a:t>Form XML file</a:t>
+              <a:rPr lang="it-IT" dirty="0"/>
+              <a:t>A partire da file XML </a:t>
             </a:r>
           </a:p>
           <a:p>
             <a:pPr lvl="1"/>
             <a:r>
-              <a:rPr lang="en-US" dirty="0"/>
-              <a:t>From Default aircraft model </a:t>
-            </a:r>
-            <a:r>
-              <a:rPr lang="en-US" sz="1600" dirty="0"/>
-              <a:t>(only ATR-72 at the moment)</a:t>
-            </a:r>
+              <a:rPr lang="it-IT" dirty="0"/>
+              <a:t>Richiamando un modello di velivolo già caricato in memoria</a:t>
+            </a:r>
+            <a:endParaRPr lang="it-IT" sz="1600" dirty="0"/>
           </a:p>
           <a:p>
             <a:pPr lvl="1"/>
             <a:r>
-              <a:rPr lang="en-US" dirty="0"/>
-              <a:t>By filling all the fields manually</a:t>
+              <a:rPr lang="it-IT" dirty="0"/>
+              <a:t>Riempiendo i campi manualmente</a:t>
             </a:r>
           </a:p>
           <a:p>
@@ -10482,26 +11301,34 @@
           </a:p>
           <a:p>
             <a:r>
-              <a:rPr lang="en-US" dirty="0"/>
-              <a:t>Possibility to define a modular aircraft and combine different components.</a:t>
-            </a:r>
-          </a:p>
-          <a:p>
-            <a:endParaRPr lang="en-US" sz="1400" dirty="0"/>
-          </a:p>
-          <a:p>
-            <a:r>
-              <a:rPr lang="en-US" dirty="0"/>
-              <a:t>Possibility to define only some aircraft components.</a:t>
-            </a:r>
-          </a:p>
-          <a:p>
-            <a:endParaRPr lang="en-US" sz="1700" dirty="0"/>
-          </a:p>
-          <a:p>
-            <a:r>
-              <a:rPr lang="en-US" dirty="0"/>
-              <a:t>Parametric representation of each aircraft component.</a:t>
+              <a:rPr lang="it-IT" dirty="0"/>
+              <a:t>Possibilità di </a:t>
+            </a:r>
+            <a:r>
+              <a:rPr lang="it-IT" dirty="0" err="1"/>
+              <a:t>compinare</a:t>
+            </a:r>
+            <a:r>
+              <a:rPr lang="it-IT" dirty="0"/>
+              <a:t> diversi component per analizzare diverse configurazioni.</a:t>
+            </a:r>
+          </a:p>
+          <a:p>
+            <a:endParaRPr lang="it-IT" sz="1400" dirty="0"/>
+          </a:p>
+          <a:p>
+            <a:r>
+              <a:rPr lang="it-IT" dirty="0"/>
+              <a:t>Possibilità di definire un velivolo in configurazione parziale.</a:t>
+            </a:r>
+          </a:p>
+          <a:p>
+            <a:endParaRPr lang="it-IT" sz="1700" dirty="0"/>
+          </a:p>
+          <a:p>
+            <a:r>
+              <a:rPr lang="it-IT" dirty="0"/>
+              <a:t>Definizione parametrica dei componenti.</a:t>
             </a:r>
           </a:p>
         </p:txBody>
@@ -10555,7 +11382,6 @@
               <a:rPr lang="it-IT" dirty="0"/>
               <a:t>JPADCommander - Input</a:t>
             </a:r>
-            <a:endParaRPr lang="it-IT" dirty="0"/>
           </a:p>
         </p:txBody>
       </p:sp>
@@ -10637,7 +11463,6 @@
               <a:rPr lang="it-IT" dirty="0"/>
               <a:t>JPADCommander - Input</a:t>
             </a:r>
-            <a:endParaRPr lang="it-IT" dirty="0"/>
           </a:p>
         </p:txBody>
       </p:sp>
@@ -10713,13 +11538,33 @@
         <p:spPr/>
         <p:txBody>
           <a:bodyPr>
-            <a:normAutofit/>
+            <a:normAutofit fontScale="90000"/>
           </a:bodyPr>
           <a:lstStyle/>
           <a:p>
             <a:r>
+              <a:rPr lang="en-US" dirty="0" err="1"/>
+              <a:t>Sviluppi</a:t>
+            </a:r>
+            <a:r>
               <a:rPr lang="en-US" dirty="0"/>
-              <a:t>Work in progress</a:t>
+              <a:t> </a:t>
+            </a:r>
+            <a:r>
+              <a:rPr lang="en-US" dirty="0" err="1"/>
+              <a:t>futuri</a:t>
+            </a:r>
+            <a:r>
+              <a:rPr lang="en-US" dirty="0"/>
+              <a:t> in </a:t>
+            </a:r>
+            <a:r>
+              <a:rPr lang="en-US" dirty="0" err="1"/>
+              <a:t>JPADCommander</a:t>
+            </a:r>
+            <a:r>
+              <a:rPr lang="en-US" dirty="0"/>
+              <a:t> </a:t>
             </a:r>
           </a:p>
         </p:txBody>
@@ -10742,99 +11587,107 @@
         </p:spPr>
         <p:txBody>
           <a:bodyPr>
-            <a:normAutofit fontScale="70000" lnSpcReduction="20000"/>
+            <a:normAutofit fontScale="77500" lnSpcReduction="20000"/>
           </a:bodyPr>
           <a:lstStyle/>
           <a:p>
-            <a:r>
-              <a:rPr lang="en-US" b="1" dirty="0"/>
-              <a:t>Analysis Manager</a:t>
-            </a:r>
-            <a:r>
-              <a:rPr lang="en-US" dirty="0"/>
-              <a:t>:</a:t>
-            </a:r>
-          </a:p>
-          <a:p>
-            <a:endParaRPr lang="en-US" sz="900" dirty="0"/>
+            <a:endParaRPr lang="it-IT" sz="900" dirty="0"/>
           </a:p>
           <a:p>
             <a:pPr lvl="1"/>
             <a:r>
-              <a:rPr lang="en-US" dirty="0"/>
-              <a:t>A modular interface aiming to manage multi-disciplinary analyses.</a:t>
+              <a:rPr lang="it-IT" dirty="0"/>
+              <a:t>Un interfaccia modulare per gestire analisi.</a:t>
             </a:r>
           </a:p>
           <a:p>
             <a:pPr marL="457200" lvl="1" indent="0">
               <a:buNone/>
             </a:pPr>
-            <a:endParaRPr lang="en-US" sz="700" dirty="0"/>
+            <a:endParaRPr lang="it-IT" sz="700" dirty="0"/>
           </a:p>
           <a:p>
             <a:pPr lvl="2"/>
             <a:r>
-              <a:rPr lang="en-US" i="1" dirty="0"/>
-              <a:t>Weights</a:t>
+              <a:rPr lang="it-IT" i="1" dirty="0"/>
+              <a:t>Pesi</a:t>
             </a:r>
           </a:p>
           <a:p>
             <a:pPr lvl="2"/>
             <a:r>
-              <a:rPr lang="en-US" i="1" dirty="0"/>
-              <a:t>Balance</a:t>
+              <a:rPr lang="it-IT" i="1" dirty="0"/>
+              <a:t>Centraggio</a:t>
             </a:r>
           </a:p>
           <a:p>
             <a:pPr lvl="2"/>
             <a:r>
-              <a:rPr lang="en-US" i="1" dirty="0"/>
-              <a:t>Aerodynamics and Stability</a:t>
+              <a:rPr lang="it-IT" i="1" dirty="0"/>
+              <a:t>Aerodinamica e Stabilità</a:t>
             </a:r>
           </a:p>
           <a:p>
             <a:pPr lvl="2"/>
             <a:r>
-              <a:rPr lang="en-US" i="1" dirty="0"/>
+              <a:rPr lang="it-IT" i="1" dirty="0"/>
               <a:t>Performance</a:t>
             </a:r>
           </a:p>
           <a:p>
             <a:pPr lvl="2"/>
             <a:r>
-              <a:rPr lang="en-US" i="1" dirty="0"/>
-              <a:t>Costs</a:t>
+              <a:rPr lang="it-IT" i="1" dirty="0"/>
+              <a:t>Costi</a:t>
             </a:r>
           </a:p>
           <a:p>
             <a:pPr lvl="2"/>
-            <a:endParaRPr lang="en-US" dirty="0"/>
+            <a:endParaRPr lang="it-IT" dirty="0"/>
           </a:p>
           <a:p>
             <a:pPr lvl="1"/>
             <a:r>
-              <a:rPr lang="en-US" dirty="0"/>
-              <a:t>Possibility to choose between a complete analysis cycle and standalone analyses thanks to a modular XML input file structure.</a:t>
-            </a:r>
+              <a:rPr lang="it-IT" dirty="0"/>
+              <a:t>Possibilità di scegliere tra un’analisi complete del velivolo oppure eseguendo single analisi utilizzando dati di input.</a:t>
+            </a:r>
+          </a:p>
+          <a:p>
+            <a:pPr marL="457200" lvl="1" indent="0">
+              <a:buNone/>
+            </a:pPr>
+            <a:endParaRPr lang="it-IT" dirty="0"/>
           </a:p>
           <a:p>
             <a:pPr lvl="1"/>
-            <a:endParaRPr lang="en-US" dirty="0"/>
-          </a:p>
-          <a:p>
-            <a:pPr lvl="1"/>
-            <a:r>
-              <a:rPr lang="en-US" dirty="0"/>
-              <a:t>Possibility to perform fast multi-objective optimizations or DOE investigations by iteratively launch one or more analysis module. </a:t>
+            <a:r>
+              <a:rPr lang="it-IT" dirty="0"/>
+              <a:t>Possibilità di effettuare ottimizzazioni </a:t>
+            </a:r>
+            <a:r>
+              <a:rPr lang="it-IT" dirty="0" err="1"/>
+              <a:t>multiobiettivo</a:t>
+            </a:r>
+            <a:r>
+              <a:rPr lang="it-IT" dirty="0"/>
+              <a:t> attraverso </a:t>
+            </a:r>
+            <a:r>
+              <a:rPr lang="it-IT" dirty="0" err="1"/>
+              <a:t>l’iterative</a:t>
+            </a:r>
+            <a:r>
+              <a:rPr lang="it-IT" dirty="0"/>
+              <a:t> lancio del ciclo di analisi. </a:t>
             </a:r>
             <a:br>
-              <a:rPr lang="en-US" dirty="0"/>
+              <a:rPr lang="it-IT" dirty="0"/>
             </a:br>
             <a:r>
-              <a:rPr lang="en-US" sz="2300" i="1" dirty="0"/>
-              <a:t>(at the moment a complete analysis cycle takes less than one minute)</a:t>
-            </a:r>
-            <a:endParaRPr lang="en-US" i="1" dirty="0"/>
+              <a:rPr lang="it-IT" sz="2300" i="1" dirty="0"/>
+              <a:t>(al momento il complete ciclo di analisi necessità di pochi minuti di calcolo.)</a:t>
+            </a:r>
+            <a:endParaRPr lang="it-IT" i="1" dirty="0"/>
           </a:p>
         </p:txBody>
       </p:sp>
@@ -10842,6 +11695,361 @@
     <p:extLst>
       <p:ext uri="{BB962C8B-B14F-4D97-AF65-F5344CB8AC3E}">
         <p14:creationId xmlns:p14="http://schemas.microsoft.com/office/powerpoint/2010/main" val="3906781592"/>
+      </p:ext>
+    </p:extLst>
+  </p:cSld>
+  <p:clrMapOvr>
+    <a:masterClrMapping/>
+  </p:clrMapOvr>
+</p:sld>
+</file>
+
+<file path=ppt/slides/slide8.xml><?xml version="1.0" encoding="utf-8"?>
+<p:sld xmlns:a="http://schemas.openxmlformats.org/drawingml/2006/main" xmlns:r="http://schemas.openxmlformats.org/officeDocument/2006/relationships" xmlns:p="http://schemas.openxmlformats.org/presentationml/2006/main">
+  <p:cSld>
+    <p:spTree>
+      <p:nvGrpSpPr>
+        <p:cNvPr id="1" name=""/>
+        <p:cNvGrpSpPr/>
+        <p:nvPr/>
+      </p:nvGrpSpPr>
+      <p:grpSpPr>
+        <a:xfrm>
+          <a:off x="0" y="0"/>
+          <a:ext cx="0" cy="0"/>
+          <a:chOff x="0" y="0"/>
+          <a:chExt cx="0" cy="0"/>
+        </a:xfrm>
+      </p:grpSpPr>
+      <p:sp>
+        <p:nvSpPr>
+          <p:cNvPr id="2" name="Titolo 1"/>
+          <p:cNvSpPr>
+            <a:spLocks noGrp="1"/>
+          </p:cNvSpPr>
+          <p:nvPr>
+            <p:ph type="title"/>
+          </p:nvPr>
+        </p:nvSpPr>
+        <p:spPr/>
+        <p:txBody>
+          <a:bodyPr/>
+          <a:lstStyle/>
+          <a:p>
+            <a:r>
+              <a:rPr lang="it-IT" dirty="0"/>
+              <a:t>JPAD Modulo Strutture</a:t>
+            </a:r>
+            <a:endParaRPr lang="en-GB" dirty="0"/>
+          </a:p>
+        </p:txBody>
+      </p:sp>
+      <p:sp>
+        <p:nvSpPr>
+          <p:cNvPr id="4" name="CasellaDiTesto 3"/>
+          <p:cNvSpPr txBox="1"/>
+          <p:nvPr/>
+        </p:nvSpPr>
+        <p:spPr>
+          <a:xfrm>
+            <a:off x="611560" y="1196752"/>
+            <a:ext cx="7920879" cy="5078313"/>
+          </a:xfrm>
+          <a:prstGeom prst="rect">
+            <a:avLst/>
+          </a:prstGeom>
+          <a:noFill/>
+        </p:spPr>
+        <p:txBody>
+          <a:bodyPr wrap="square" rtlCol="0">
+            <a:spAutoFit/>
+          </a:bodyPr>
+          <a:lstStyle/>
+          <a:p>
+            <a:pPr marL="285750" indent="-285750">
+              <a:buFont typeface="Arial" panose="020B0604020202020204" pitchFamily="34" charset="0"/>
+              <a:buChar char="•"/>
+            </a:pPr>
+            <a:r>
+              <a:rPr lang="it-IT" dirty="0"/>
+              <a:t>Sviluppo di un codice </a:t>
+            </a:r>
+            <a:r>
+              <a:rPr lang="it-IT" dirty="0" err="1"/>
+              <a:t>Matlab</a:t>
+            </a:r>
+            <a:r>
+              <a:rPr lang="it-IT" dirty="0"/>
+              <a:t> che si interfaccia con la libreria java per costruire un modello FEM della struttura alare.</a:t>
+            </a:r>
+          </a:p>
+          <a:p>
+            <a:pPr marL="285750" indent="-285750">
+              <a:buFont typeface="Arial" panose="020B0604020202020204" pitchFamily="34" charset="0"/>
+              <a:buChar char="•"/>
+            </a:pPr>
+            <a:endParaRPr lang="it-IT" dirty="0"/>
+          </a:p>
+          <a:p>
+            <a:pPr marL="285750" indent="-285750">
+              <a:buFont typeface="Arial" panose="020B0604020202020204" pitchFamily="34" charset="0"/>
+              <a:buChar char="•"/>
+            </a:pPr>
+            <a:r>
+              <a:rPr lang="it-IT" dirty="0"/>
+              <a:t>In input sono passati i parametri della geometria e i carichi di forza e momento aerodinamico allo scopo di :</a:t>
+            </a:r>
+          </a:p>
+          <a:p>
+            <a:pPr marL="742950" lvl="1" indent="-285750">
+              <a:buFont typeface="Arial" panose="020B0604020202020204" pitchFamily="34" charset="0"/>
+              <a:buChar char="•"/>
+            </a:pPr>
+            <a:r>
+              <a:rPr lang="it-IT" dirty="0"/>
+              <a:t>scrivere la mesh della geometria di pannelli, longheroni, centine e correnti</a:t>
+            </a:r>
+          </a:p>
+          <a:p>
+            <a:pPr marL="742950" lvl="1" indent="-285750">
+              <a:buFont typeface="Arial" panose="020B0604020202020204" pitchFamily="34" charset="0"/>
+              <a:buChar char="•"/>
+            </a:pPr>
+            <a:r>
+              <a:rPr lang="it-IT" dirty="0"/>
+              <a:t>scrivere il modello aerodinamico DLM dell'ala  </a:t>
+            </a:r>
+          </a:p>
+          <a:p>
+            <a:pPr marL="742950" lvl="1" indent="-285750">
+              <a:buFont typeface="Arial" panose="020B0604020202020204" pitchFamily="34" charset="0"/>
+              <a:buChar char="•"/>
+            </a:pPr>
+            <a:r>
+              <a:rPr lang="it-IT" dirty="0"/>
+              <a:t>stimare i parametri di primo progetto da inserire come proprietà degli elementi strutturali.</a:t>
+            </a:r>
+          </a:p>
+          <a:p>
+            <a:pPr marL="742950" lvl="1" indent="-285750">
+              <a:buFont typeface="Arial" panose="020B0604020202020204" pitchFamily="34" charset="0"/>
+              <a:buChar char="•"/>
+            </a:pPr>
+            <a:endParaRPr lang="it-IT" dirty="0"/>
+          </a:p>
+          <a:p>
+            <a:pPr marL="285750" indent="-285750">
+              <a:buFont typeface="Arial" panose="020B0604020202020204" pitchFamily="34" charset="0"/>
+              <a:buChar char="•"/>
+            </a:pPr>
+            <a:r>
+              <a:rPr lang="it-IT" dirty="0"/>
+              <a:t>Il codice </a:t>
+            </a:r>
+            <a:r>
+              <a:rPr lang="it-IT" dirty="0" err="1"/>
+              <a:t>Matlab</a:t>
+            </a:r>
+            <a:r>
+              <a:rPr lang="it-IT" dirty="0"/>
+              <a:t> scrive file di testo che vengono letti dal solutore commerciale principalmente in uso nel settore aeronautico </a:t>
+            </a:r>
+            <a:r>
+              <a:rPr lang="it-IT" dirty="0" err="1"/>
+              <a:t>MSC.Nastran</a:t>
+            </a:r>
+            <a:r>
+              <a:rPr lang="it-IT" dirty="0"/>
+              <a:t>, il quale li usa per effettuare le prove di risposta statica tramite la SOL101 e le prove aeroelastiche tramite SOL145.</a:t>
+            </a:r>
+          </a:p>
+          <a:p>
+            <a:endParaRPr lang="it-IT" dirty="0"/>
+          </a:p>
+          <a:p>
+            <a:pPr marL="285750" indent="-285750">
+              <a:buFont typeface="Arial" panose="020B0604020202020204" pitchFamily="34" charset="0"/>
+              <a:buChar char="•"/>
+            </a:pPr>
+            <a:r>
+              <a:rPr lang="it-IT" dirty="0"/>
+              <a:t>Gli output dell'analisi con </a:t>
+            </a:r>
+            <a:r>
+              <a:rPr lang="it-IT" dirty="0" err="1"/>
+              <a:t>Nastran</a:t>
+            </a:r>
+            <a:r>
+              <a:rPr lang="it-IT" dirty="0"/>
+              <a:t> sono le sollecitazioni massime per la soluzione statica e la velocità di </a:t>
+            </a:r>
+            <a:r>
+              <a:rPr lang="it-IT" dirty="0" err="1"/>
+              <a:t>flutter</a:t>
+            </a:r>
+            <a:r>
+              <a:rPr lang="it-IT" dirty="0"/>
+              <a:t> per quella aeroelastica.</a:t>
+            </a:r>
+            <a:endParaRPr lang="en-GB" dirty="0"/>
+          </a:p>
+        </p:txBody>
+      </p:sp>
+    </p:spTree>
+    <p:extLst>
+      <p:ext uri="{BB962C8B-B14F-4D97-AF65-F5344CB8AC3E}">
+        <p14:creationId xmlns:p14="http://schemas.microsoft.com/office/powerpoint/2010/main" val="3375872081"/>
+      </p:ext>
+    </p:extLst>
+  </p:cSld>
+  <p:clrMapOvr>
+    <a:masterClrMapping/>
+  </p:clrMapOvr>
+</p:sld>
+</file>
+
+<file path=ppt/slides/slide9.xml><?xml version="1.0" encoding="utf-8"?>
+<p:sld xmlns:a="http://schemas.openxmlformats.org/drawingml/2006/main" xmlns:r="http://schemas.openxmlformats.org/officeDocument/2006/relationships" xmlns:p="http://schemas.openxmlformats.org/presentationml/2006/main">
+  <p:cSld>
+    <p:spTree>
+      <p:nvGrpSpPr>
+        <p:cNvPr id="1" name=""/>
+        <p:cNvGrpSpPr/>
+        <p:nvPr/>
+      </p:nvGrpSpPr>
+      <p:grpSpPr>
+        <a:xfrm>
+          <a:off x="0" y="0"/>
+          <a:ext cx="0" cy="0"/>
+          <a:chOff x="0" y="0"/>
+          <a:chExt cx="0" cy="0"/>
+        </a:xfrm>
+      </p:grpSpPr>
+      <p:sp>
+        <p:nvSpPr>
+          <p:cNvPr id="2" name="Titolo 1"/>
+          <p:cNvSpPr>
+            <a:spLocks noGrp="1"/>
+          </p:cNvSpPr>
+          <p:nvPr>
+            <p:ph type="title"/>
+          </p:nvPr>
+        </p:nvSpPr>
+        <p:spPr/>
+        <p:txBody>
+          <a:bodyPr/>
+          <a:lstStyle/>
+          <a:p>
+            <a:r>
+              <a:rPr lang="it-IT" dirty="0"/>
+              <a:t>JPAD Modulo Strutture</a:t>
+            </a:r>
+            <a:endParaRPr lang="en-GB" dirty="0"/>
+          </a:p>
+        </p:txBody>
+      </p:sp>
+      <p:pic>
+        <p:nvPicPr>
+          <p:cNvPr id="5" name="Immagine 4"/>
+          <p:cNvPicPr>
+            <a:picLocks noChangeAspect="1"/>
+          </p:cNvPicPr>
+          <p:nvPr/>
+        </p:nvPicPr>
+        <p:blipFill>
+          <a:blip r:embed="rId2">
+            <a:extLst>
+              <a:ext uri="{28A0092B-C50C-407E-A947-70E740481C1C}">
+                <a14:useLocalDpi xmlns:a14="http://schemas.microsoft.com/office/drawing/2010/main" val="0"/>
+              </a:ext>
+            </a:extLst>
+          </a:blip>
+          <a:stretch>
+            <a:fillRect/>
+          </a:stretch>
+        </p:blipFill>
+        <p:spPr>
+          <a:xfrm>
+            <a:off x="683568" y="2708920"/>
+            <a:ext cx="7766520" cy="3350821"/>
+          </a:xfrm>
+          <a:prstGeom prst="rect">
+            <a:avLst/>
+          </a:prstGeom>
+        </p:spPr>
+      </p:pic>
+      <p:sp>
+        <p:nvSpPr>
+          <p:cNvPr id="6" name="CasellaDiTesto 5"/>
+          <p:cNvSpPr txBox="1"/>
+          <p:nvPr/>
+        </p:nvSpPr>
+        <p:spPr>
+          <a:xfrm>
+            <a:off x="323528" y="1268760"/>
+            <a:ext cx="8208911" cy="1477328"/>
+          </a:xfrm>
+          <a:prstGeom prst="rect">
+            <a:avLst/>
+          </a:prstGeom>
+          <a:noFill/>
+        </p:spPr>
+        <p:txBody>
+          <a:bodyPr wrap="square" rtlCol="0">
+            <a:spAutoFit/>
+          </a:bodyPr>
+          <a:lstStyle/>
+          <a:p>
+            <a:r>
+              <a:rPr lang="it-IT" dirty="0"/>
+              <a:t>Il codice definisce un </a:t>
+            </a:r>
+            <a:r>
+              <a:rPr lang="it-IT" b="1" dirty="0"/>
+              <a:t>modello FEM </a:t>
+            </a:r>
+            <a:r>
+              <a:rPr lang="it-IT" dirty="0"/>
+              <a:t>semplificato della struttura alare. In particolare sono modellati i pannelli alari, le anime dei longheroni e le centine tramite elementi SHELL mentre le flange dei longheroni e i correnti tramite elementi BEAM a sezione rettangolare. Le centine sono modellate tramite una distribuzione uniforme di spessore. </a:t>
+            </a:r>
+            <a:endParaRPr lang="en-GB" dirty="0"/>
+          </a:p>
+        </p:txBody>
+      </p:sp>
+      <p:sp>
+        <p:nvSpPr>
+          <p:cNvPr id="7" name="CasellaDiTesto 6"/>
+          <p:cNvSpPr txBox="1"/>
+          <p:nvPr/>
+        </p:nvSpPr>
+        <p:spPr>
+          <a:xfrm>
+            <a:off x="3115950" y="6094730"/>
+            <a:ext cx="2901756" cy="369332"/>
+          </a:xfrm>
+          <a:prstGeom prst="rect">
+            <a:avLst/>
+          </a:prstGeom>
+          <a:noFill/>
+        </p:spPr>
+        <p:txBody>
+          <a:bodyPr wrap="none" rtlCol="0">
+            <a:spAutoFit/>
+          </a:bodyPr>
+          <a:lstStyle/>
+          <a:p>
+            <a:r>
+              <a:rPr lang="it-IT" dirty="0"/>
+              <a:t>Modello FEM della semiala</a:t>
+            </a:r>
+            <a:endParaRPr lang="en-GB" dirty="0"/>
+          </a:p>
+        </p:txBody>
+      </p:sp>
+    </p:spTree>
+    <p:extLst>
+      <p:ext uri="{BB962C8B-B14F-4D97-AF65-F5344CB8AC3E}">
+        <p14:creationId xmlns:p14="http://schemas.microsoft.com/office/powerpoint/2010/main" val="2753326964"/>
       </p:ext>
     </p:extLst>
   </p:cSld>

</xml_diff>